<commit_message>
feat: restructure Stata All in One extension
- Change main entry point from extension.js to main.js for better compatibility.
- Add detailed project structure documentation in STRUCTURE.md.
- Implement core functionalities in src/extension.js, including command registration for heading levels, separators, comments, and code execution.
- Introduce modules for handling comments, outline view, separators, and code execution across platforms (macOS and Windows).
- Add utility functions for common tasks such as showing messages, checking OS, and managing configurations.
- Implement separator management with customizable characters and lengths.
- Enhance code execution capabilities with temporary file handling and platform-specific implementations.
</commit_message>
<xml_diff>
--- a/icon.pptx
+++ b/icon.pptx
@@ -6,8 +6,6 @@
   </p:sldMasterIdLst>
   <p:sldIdLst>
     <p:sldId id="256" r:id="rId2"/>
-    <p:sldId id="258" r:id="rId3"/>
-    <p:sldId id="257" r:id="rId4"/>
   </p:sldIdLst>
   <p:sldSz cx="3600450" cy="3600450"/>
   <p:notesSz cx="6858000" cy="9144000"/>
@@ -119,7 +117,7 @@
   <pc:docChgLst>
     <pc:chgData name="Zihao Viston Wang" userId="bb38f0bb24686ff5" providerId="LiveId" clId="{6B238CD4-3FE9-582E-A7AB-2A0F90EE9F12}"/>
     <pc:docChg chg="undo custSel addSld delSld modSld">
-      <pc:chgData name="Zihao Viston Wang" userId="bb38f0bb24686ff5" providerId="LiveId" clId="{6B238CD4-3FE9-582E-A7AB-2A0F90EE9F12}" dt="2026-01-26T14:43:33.930" v="323" actId="1035"/>
+      <pc:chgData name="Zihao Viston Wang" userId="bb38f0bb24686ff5" providerId="LiveId" clId="{6B238CD4-3FE9-582E-A7AB-2A0F90EE9F12}" dt="2026-01-26T15:48:26.139" v="324" actId="2696"/>
       <pc:docMkLst>
         <pc:docMk/>
       </pc:docMkLst>
@@ -169,6 +167,20 @@
             <ac:grpSpMk id="3" creationId="{1A47D585-7C40-2604-E895-7AD0A1120EEC}"/>
           </ac:grpSpMkLst>
         </pc:grpChg>
+      </pc:sldChg>
+      <pc:sldChg chg="del">
+        <pc:chgData name="Zihao Viston Wang" userId="bb38f0bb24686ff5" providerId="LiveId" clId="{6B238CD4-3FE9-582E-A7AB-2A0F90EE9F12}" dt="2026-01-26T15:48:26.139" v="324" actId="2696"/>
+        <pc:sldMkLst>
+          <pc:docMk/>
+          <pc:sldMk cId="3746901599" sldId="257"/>
+        </pc:sldMkLst>
+      </pc:sldChg>
+      <pc:sldChg chg="del">
+        <pc:chgData name="Zihao Viston Wang" userId="bb38f0bb24686ff5" providerId="LiveId" clId="{6B238CD4-3FE9-582E-A7AB-2A0F90EE9F12}" dt="2026-01-26T15:48:26.139" v="324" actId="2696"/>
+        <pc:sldMkLst>
+          <pc:docMk/>
+          <pc:sldMk cId="1889546128" sldId="258"/>
+        </pc:sldMkLst>
       </pc:sldChg>
     </pc:docChg>
   </pc:docChgLst>
@@ -3382,749 +3394,6 @@
 </p:sld>
 </file>
 
-<file path=ppt/slides/slide2.xml><?xml version="1.0" encoding="utf-8"?>
-<p:sld xmlns:a="http://schemas.openxmlformats.org/drawingml/2006/main" xmlns:r="http://schemas.openxmlformats.org/officeDocument/2006/relationships" xmlns:p="http://schemas.openxmlformats.org/presentationml/2006/main">
-  <p:cSld>
-    <p:spTree>
-      <p:nvGrpSpPr>
-        <p:cNvPr id="1" name="">
-          <a:extLst>
-            <a:ext uri="{FF2B5EF4-FFF2-40B4-BE49-F238E27FC236}">
-              <a16:creationId xmlns:a16="http://schemas.microsoft.com/office/drawing/2014/main" id="{574D136B-3D14-D518-9641-2C948037A521}"/>
-            </a:ext>
-          </a:extLst>
-        </p:cNvPr>
-        <p:cNvGrpSpPr/>
-        <p:nvPr/>
-      </p:nvGrpSpPr>
-      <p:grpSpPr>
-        <a:xfrm>
-          <a:off x="0" y="0"/>
-          <a:ext cx="0" cy="0"/>
-          <a:chOff x="0" y="0"/>
-          <a:chExt cx="0" cy="0"/>
-        </a:xfrm>
-      </p:grpSpPr>
-      <p:sp>
-        <p:nvSpPr>
-          <p:cNvPr id="5" name="矩形 4">
-            <a:extLst>
-              <a:ext uri="{FF2B5EF4-FFF2-40B4-BE49-F238E27FC236}">
-                <a16:creationId xmlns:a16="http://schemas.microsoft.com/office/drawing/2014/main" id="{B61FA6B0-B45D-9FBD-A158-1C5BE1DA20C5}"/>
-              </a:ext>
-            </a:extLst>
-          </p:cNvPr>
-          <p:cNvSpPr/>
-          <p:nvPr/>
-        </p:nvSpPr>
-        <p:spPr>
-          <a:xfrm>
-            <a:off x="0" y="0"/>
-            <a:ext cx="3600450" cy="3600450"/>
-          </a:xfrm>
-          <a:prstGeom prst="rect">
-            <a:avLst/>
-          </a:prstGeom>
-        </p:spPr>
-        <p:style>
-          <a:lnRef idx="2">
-            <a:schemeClr val="dk1">
-              <a:shade val="15000"/>
-            </a:schemeClr>
-          </a:lnRef>
-          <a:fillRef idx="1">
-            <a:schemeClr val="dk1"/>
-          </a:fillRef>
-          <a:effectRef idx="0">
-            <a:schemeClr val="dk1"/>
-          </a:effectRef>
-          <a:fontRef idx="minor">
-            <a:schemeClr val="lt1"/>
-          </a:fontRef>
-        </p:style>
-        <p:txBody>
-          <a:bodyPr rtlCol="0" anchor="ctr"/>
-          <a:lstStyle/>
-          <a:p>
-            <a:pPr>
-              <a:lnSpc>
-                <a:spcPct val="150000"/>
-              </a:lnSpc>
-            </a:pPr>
-            <a:endParaRPr kumimoji="1" lang="zh-CN" altLang="en-US" sz="4000" b="1" dirty="0">
-              <a:solidFill>
-                <a:schemeClr val="bg1"/>
-              </a:solidFill>
-              <a:latin typeface="Toppan Bunkyu Midashi Gothic Ex" panose="020B0900000000000000" pitchFamily="34" charset="-128"/>
-              <a:ea typeface="Toppan Bunkyu Midashi Gothic Ex" panose="020B0900000000000000" pitchFamily="34" charset="-128"/>
-            </a:endParaRPr>
-          </a:p>
-        </p:txBody>
-      </p:sp>
-      <p:sp>
-        <p:nvSpPr>
-          <p:cNvPr id="4" name="文本框 3">
-            <a:extLst>
-              <a:ext uri="{FF2B5EF4-FFF2-40B4-BE49-F238E27FC236}">
-                <a16:creationId xmlns:a16="http://schemas.microsoft.com/office/drawing/2014/main" id="{9A425749-7E77-C082-3031-ED13088E60F2}"/>
-              </a:ext>
-            </a:extLst>
-          </p:cNvPr>
-          <p:cNvSpPr txBox="1"/>
-          <p:nvPr/>
-        </p:nvSpPr>
-        <p:spPr>
-          <a:xfrm>
-            <a:off x="144583" y="601708"/>
-            <a:ext cx="3031599" cy="1241878"/>
-          </a:xfrm>
-          <a:prstGeom prst="rect">
-            <a:avLst/>
-          </a:prstGeom>
-          <a:noFill/>
-        </p:spPr>
-        <p:txBody>
-          <a:bodyPr wrap="none" rtlCol="0">
-            <a:spAutoFit/>
-          </a:bodyPr>
-          <a:lstStyle/>
-          <a:p>
-            <a:pPr>
-              <a:lnSpc>
-                <a:spcPct val="150000"/>
-              </a:lnSpc>
-            </a:pPr>
-            <a:r>
-              <a:rPr kumimoji="1" lang="zh-CN" altLang="en-US" sz="4000" b="1" dirty="0">
-                <a:solidFill>
-                  <a:schemeClr val="bg1"/>
-                </a:solidFill>
-                <a:latin typeface="Toppan Bunkyu Midashi Gothic Ex" panose="020B0900000000000000" pitchFamily="34" charset="-128"/>
-                <a:ea typeface="Toppan Bunkyu Midashi Gothic Ex" panose="020B0900000000000000" pitchFamily="34" charset="-128"/>
-              </a:rPr>
-              <a:t>* </a:t>
-            </a:r>
-            <a:r>
-              <a:rPr kumimoji="1" lang="en-US" altLang="zh-CN" sz="4000" b="1" dirty="0">
-                <a:solidFill>
-                  <a:schemeClr val="bg1"/>
-                </a:solidFill>
-                <a:latin typeface="Toppan Bunkyu Midashi Gothic Ex" panose="020B0900000000000000" pitchFamily="34" charset="-128"/>
-                <a:ea typeface="Toppan Bunkyu Midashi Gothic Ex" panose="020B0900000000000000" pitchFamily="34" charset="-128"/>
-              </a:rPr>
-              <a:t>#</a:t>
-            </a:r>
-            <a:r>
-              <a:rPr kumimoji="1" lang="zh-CN" altLang="en-US" sz="4000" b="1" dirty="0">
-                <a:solidFill>
-                  <a:schemeClr val="bg1"/>
-                </a:solidFill>
-                <a:latin typeface="Toppan Bunkyu Midashi Gothic Ex" panose="020B0900000000000000" pitchFamily="34" charset="-128"/>
-                <a:ea typeface="Toppan Bunkyu Midashi Gothic Ex" panose="020B0900000000000000" pitchFamily="34" charset="-128"/>
-              </a:rPr>
-              <a:t> </a:t>
-            </a:r>
-            <a:r>
-              <a:rPr kumimoji="1" lang="en-US" altLang="zh-CN" sz="6000" b="1" dirty="0">
-                <a:ln w="9525">
-                  <a:solidFill>
-                    <a:schemeClr val="bg1"/>
-                  </a:solidFill>
-                  <a:prstDash val="solid"/>
-                </a:ln>
-                <a:solidFill>
-                  <a:schemeClr val="accent5"/>
-                </a:solidFill>
-                <a:effectLst>
-                  <a:outerShdw blurRad="12700" dist="38100" dir="2700000" algn="tl" rotWithShape="0">
-                    <a:schemeClr val="accent5">
-                      <a:lumMod val="60000"/>
-                      <a:lumOff val="40000"/>
-                    </a:schemeClr>
-                  </a:outerShdw>
-                </a:effectLst>
-                <a:latin typeface="Toppan Bunkyu Midashi Gothic Ex" panose="020B0900000000000000" pitchFamily="34" charset="-128"/>
-                <a:ea typeface="Toppan Bunkyu Midashi Gothic Ex" panose="020B0900000000000000" pitchFamily="34" charset="-128"/>
-              </a:rPr>
-              <a:t>Stata</a:t>
-            </a:r>
-            <a:endParaRPr kumimoji="1" lang="en-US" altLang="zh-CN" sz="5400" b="1" dirty="0">
-              <a:solidFill>
-                <a:schemeClr val="bg1"/>
-              </a:solidFill>
-              <a:latin typeface="Toppan Bunkyu Midashi Gothic Ex" panose="020B0900000000000000" pitchFamily="34" charset="-128"/>
-              <a:ea typeface="Toppan Bunkyu Midashi Gothic Ex" panose="020B0900000000000000" pitchFamily="34" charset="-128"/>
-            </a:endParaRPr>
-          </a:p>
-        </p:txBody>
-      </p:sp>
-      <p:sp>
-        <p:nvSpPr>
-          <p:cNvPr id="7" name="文本框 6">
-            <a:extLst>
-              <a:ext uri="{FF2B5EF4-FFF2-40B4-BE49-F238E27FC236}">
-                <a16:creationId xmlns:a16="http://schemas.microsoft.com/office/drawing/2014/main" id="{70F98335-D6EF-73CE-128B-14BB9D320473}"/>
-              </a:ext>
-            </a:extLst>
-          </p:cNvPr>
-          <p:cNvSpPr txBox="1"/>
-          <p:nvPr/>
-        </p:nvSpPr>
-        <p:spPr>
-          <a:xfrm>
-            <a:off x="144584" y="1765528"/>
-            <a:ext cx="3337596" cy="858697"/>
-          </a:xfrm>
-          <a:prstGeom prst="rect">
-            <a:avLst/>
-          </a:prstGeom>
-          <a:noFill/>
-        </p:spPr>
-        <p:txBody>
-          <a:bodyPr wrap="square">
-            <a:spAutoFit/>
-          </a:bodyPr>
-          <a:lstStyle/>
-          <a:p>
-            <a:pPr>
-              <a:lnSpc>
-                <a:spcPct val="150000"/>
-              </a:lnSpc>
-            </a:pPr>
-            <a:r>
-              <a:rPr kumimoji="1" lang="zh-CN" altLang="en-US" sz="4000" b="1" dirty="0">
-                <a:solidFill>
-                  <a:schemeClr val="bg1"/>
-                </a:solidFill>
-                <a:latin typeface="Toppan Bunkyu Midashi Gothic Ex" panose="020B0900000000000000" pitchFamily="34" charset="-128"/>
-                <a:ea typeface="Toppan Bunkyu Midashi Gothic Ex" panose="020B0900000000000000" pitchFamily="34" charset="-128"/>
-              </a:rPr>
-              <a:t>* </a:t>
-            </a:r>
-            <a:r>
-              <a:rPr kumimoji="1" lang="en-US" altLang="zh-CN" sz="4000" b="1" dirty="0">
-                <a:solidFill>
-                  <a:schemeClr val="bg1"/>
-                </a:solidFill>
-                <a:latin typeface="Toppan Bunkyu Midashi Gothic Ex" panose="020B0900000000000000" pitchFamily="34" charset="-128"/>
-                <a:ea typeface="Toppan Bunkyu Midashi Gothic Ex" panose="020B0900000000000000" pitchFamily="34" charset="-128"/>
-              </a:rPr>
-              <a:t>##</a:t>
-            </a:r>
-            <a:r>
-              <a:rPr kumimoji="1" lang="zh-CN" altLang="en-US" sz="4000" b="1" dirty="0">
-                <a:solidFill>
-                  <a:schemeClr val="bg1"/>
-                </a:solidFill>
-                <a:latin typeface="Toppan Bunkyu Midashi Gothic Ex" panose="020B0900000000000000" pitchFamily="34" charset="-128"/>
-                <a:ea typeface="Toppan Bunkyu Midashi Gothic Ex" panose="020B0900000000000000" pitchFamily="34" charset="-128"/>
-              </a:rPr>
-              <a:t> </a:t>
-            </a:r>
-            <a:r>
-              <a:rPr kumimoji="1" lang="en-US" altLang="zh-CN" sz="3800" b="1" dirty="0">
-                <a:ln w="10160">
-                  <a:solidFill>
-                    <a:srgbClr val="00B0F0"/>
-                  </a:solidFill>
-                  <a:prstDash val="solid"/>
-                </a:ln>
-                <a:solidFill>
-                  <a:srgbClr val="FFFFFF"/>
-                </a:solidFill>
-                <a:effectLst>
-                  <a:outerShdw blurRad="38100" dist="22860" dir="5400000" algn="tl" rotWithShape="0">
-                    <a:srgbClr val="000000">
-                      <a:alpha val="30000"/>
-                    </a:srgbClr>
-                  </a:outerShdw>
-                </a:effectLst>
-                <a:latin typeface="Toppan Bunkyu Midashi Gothic Ex" panose="020B0900000000000000" pitchFamily="34" charset="-128"/>
-                <a:ea typeface="Toppan Bunkyu Midashi Gothic Ex" panose="020B0900000000000000" pitchFamily="34" charset="-128"/>
-              </a:rPr>
-              <a:t>Outline</a:t>
-            </a:r>
-            <a:endParaRPr kumimoji="1" lang="zh-CN" altLang="en-US" sz="3800" b="1" dirty="0">
-              <a:ln w="10160">
-                <a:solidFill>
-                  <a:srgbClr val="00B0F0"/>
-                </a:solidFill>
-                <a:prstDash val="solid"/>
-              </a:ln>
-              <a:solidFill>
-                <a:schemeClr val="bg1"/>
-              </a:solidFill>
-              <a:latin typeface="Toppan Bunkyu Midashi Gothic Ex" panose="020B0900000000000000" pitchFamily="34" charset="-128"/>
-              <a:ea typeface="Toppan Bunkyu Midashi Gothic Ex" panose="020B0900000000000000" pitchFamily="34" charset="-128"/>
-            </a:endParaRPr>
-          </a:p>
-        </p:txBody>
-      </p:sp>
-      <p:pic>
-        <p:nvPicPr>
-          <p:cNvPr id="10" name="图片 9">
-            <a:extLst>
-              <a:ext uri="{FF2B5EF4-FFF2-40B4-BE49-F238E27FC236}">
-                <a16:creationId xmlns:a16="http://schemas.microsoft.com/office/drawing/2014/main" id="{DFAD7367-6A4F-508A-5673-2D53B3280DA9}"/>
-              </a:ext>
-            </a:extLst>
-          </p:cNvPr>
-          <p:cNvPicPr>
-            <a:picLocks noChangeAspect="1"/>
-          </p:cNvPicPr>
-          <p:nvPr/>
-        </p:nvPicPr>
-        <p:blipFill>
-          <a:blip r:embed="rId2"/>
-          <a:stretch>
-            <a:fillRect/>
-          </a:stretch>
-        </p:blipFill>
-        <p:spPr>
-          <a:xfrm>
-            <a:off x="2753316" y="675839"/>
-            <a:ext cx="635000" cy="457200"/>
-          </a:xfrm>
-          <a:prstGeom prst="rect">
-            <a:avLst/>
-          </a:prstGeom>
-        </p:spPr>
-      </p:pic>
-    </p:spTree>
-    <p:extLst>
-      <p:ext uri="{BB962C8B-B14F-4D97-AF65-F5344CB8AC3E}">
-        <p14:creationId xmlns:p14="http://schemas.microsoft.com/office/powerpoint/2010/main" val="1889546128"/>
-      </p:ext>
-    </p:extLst>
-  </p:cSld>
-  <p:clrMapOvr>
-    <a:masterClrMapping/>
-  </p:clrMapOvr>
-</p:sld>
-</file>
-
-<file path=ppt/slides/slide3.xml><?xml version="1.0" encoding="utf-8"?>
-<p:sld xmlns:a="http://schemas.openxmlformats.org/drawingml/2006/main" xmlns:r="http://schemas.openxmlformats.org/officeDocument/2006/relationships" xmlns:p="http://schemas.openxmlformats.org/presentationml/2006/main">
-  <p:cSld>
-    <p:spTree>
-      <p:nvGrpSpPr>
-        <p:cNvPr id="1" name="">
-          <a:extLst>
-            <a:ext uri="{FF2B5EF4-FFF2-40B4-BE49-F238E27FC236}">
-              <a16:creationId xmlns:a16="http://schemas.microsoft.com/office/drawing/2014/main" id="{FDDB3135-67A5-3C9F-0821-DDE61BDCD088}"/>
-            </a:ext>
-          </a:extLst>
-        </p:cNvPr>
-        <p:cNvGrpSpPr/>
-        <p:nvPr/>
-      </p:nvGrpSpPr>
-      <p:grpSpPr>
-        <a:xfrm>
-          <a:off x="0" y="0"/>
-          <a:ext cx="0" cy="0"/>
-          <a:chOff x="0" y="0"/>
-          <a:chExt cx="0" cy="0"/>
-        </a:xfrm>
-      </p:grpSpPr>
-      <p:grpSp>
-        <p:nvGrpSpPr>
-          <p:cNvPr id="2" name="组合 1">
-            <a:extLst>
-              <a:ext uri="{FF2B5EF4-FFF2-40B4-BE49-F238E27FC236}">
-                <a16:creationId xmlns:a16="http://schemas.microsoft.com/office/drawing/2014/main" id="{32EEAD8F-5E2D-3F4A-2FCA-1B04EE718294}"/>
-              </a:ext>
-            </a:extLst>
-          </p:cNvPr>
-          <p:cNvGrpSpPr/>
-          <p:nvPr/>
-        </p:nvGrpSpPr>
-        <p:grpSpPr>
-          <a:xfrm>
-            <a:off x="0" y="0"/>
-            <a:ext cx="3614385" cy="3600450"/>
-            <a:chOff x="0" y="0"/>
-            <a:chExt cx="3614385" cy="3600450"/>
-          </a:xfrm>
-        </p:grpSpPr>
-        <p:sp>
-          <p:nvSpPr>
-            <p:cNvPr id="5" name="矩形 4">
-              <a:extLst>
-                <a:ext uri="{FF2B5EF4-FFF2-40B4-BE49-F238E27FC236}">
-                  <a16:creationId xmlns:a16="http://schemas.microsoft.com/office/drawing/2014/main" id="{55A4266A-4F42-EF7B-8FEA-F4E21E00AEE3}"/>
-                </a:ext>
-              </a:extLst>
-            </p:cNvPr>
-            <p:cNvSpPr/>
-            <p:nvPr/>
-          </p:nvSpPr>
-          <p:spPr>
-            <a:xfrm>
-              <a:off x="0" y="0"/>
-              <a:ext cx="3600450" cy="3600450"/>
-            </a:xfrm>
-            <a:prstGeom prst="rect">
-              <a:avLst/>
-            </a:prstGeom>
-            <a:solidFill>
-              <a:schemeClr val="tx1">
-                <a:lumMod val="95000"/>
-                <a:lumOff val="5000"/>
-              </a:schemeClr>
-            </a:solidFill>
-          </p:spPr>
-          <p:style>
-            <a:lnRef idx="2">
-              <a:schemeClr val="dk1">
-                <a:shade val="15000"/>
-              </a:schemeClr>
-            </a:lnRef>
-            <a:fillRef idx="1">
-              <a:schemeClr val="dk1"/>
-            </a:fillRef>
-            <a:effectRef idx="0">
-              <a:schemeClr val="dk1"/>
-            </a:effectRef>
-            <a:fontRef idx="minor">
-              <a:schemeClr val="lt1"/>
-            </a:fontRef>
-          </p:style>
-          <p:txBody>
-            <a:bodyPr rtlCol="0" anchor="ctr"/>
-            <a:lstStyle/>
-            <a:p>
-              <a:pPr>
-                <a:lnSpc>
-                  <a:spcPct val="150000"/>
-                </a:lnSpc>
-              </a:pPr>
-              <a:endParaRPr kumimoji="1" lang="zh-CN" altLang="en-US" sz="5400" b="1" dirty="0">
-                <a:solidFill>
-                  <a:schemeClr val="bg1"/>
-                </a:solidFill>
-                <a:latin typeface="Toppan Bunkyu Midashi Gothic Ex" panose="020B0900000000000000" pitchFamily="34" charset="-128"/>
-                <a:ea typeface="Toppan Bunkyu Midashi Gothic Ex" panose="020B0900000000000000" pitchFamily="34" charset="-128"/>
-              </a:endParaRPr>
-            </a:p>
-          </p:txBody>
-        </p:sp>
-        <p:sp>
-          <p:nvSpPr>
-            <p:cNvPr id="4" name="文本框 3">
-              <a:extLst>
-                <a:ext uri="{FF2B5EF4-FFF2-40B4-BE49-F238E27FC236}">
-                  <a16:creationId xmlns:a16="http://schemas.microsoft.com/office/drawing/2014/main" id="{E2D2B60C-299D-BAB0-31EF-04C0A803EC0C}"/>
-                </a:ext>
-              </a:extLst>
-            </p:cNvPr>
-            <p:cNvSpPr txBox="1"/>
-            <p:nvPr/>
-          </p:nvSpPr>
-          <p:spPr>
-            <a:xfrm>
-              <a:off x="56763" y="281118"/>
-              <a:ext cx="3313728" cy="1625060"/>
-            </a:xfrm>
-            <a:prstGeom prst="rect">
-              <a:avLst/>
-            </a:prstGeom>
-            <a:noFill/>
-          </p:spPr>
-          <p:txBody>
-            <a:bodyPr wrap="none" rtlCol="0">
-              <a:spAutoFit/>
-            </a:bodyPr>
-            <a:lstStyle/>
-            <a:p>
-              <a:pPr>
-                <a:lnSpc>
-                  <a:spcPct val="150000"/>
-                </a:lnSpc>
-              </a:pPr>
-              <a:r>
-                <a:rPr kumimoji="1" lang="zh-CN" altLang="en-US" sz="4000" b="1" dirty="0">
-                  <a:solidFill>
-                    <a:schemeClr val="bg1">
-                      <a:lumMod val="75000"/>
-                    </a:schemeClr>
-                  </a:solidFill>
-                  <a:latin typeface="Toppan Bunkyu Midashi Gothic Ex" panose="020B0900000000000000" pitchFamily="34" charset="-128"/>
-                  <a:ea typeface="Toppan Bunkyu Midashi Gothic Ex" panose="020B0900000000000000" pitchFamily="34" charset="-128"/>
-                </a:rPr>
-                <a:t>**</a:t>
-              </a:r>
-              <a:r>
-                <a:rPr kumimoji="1" lang="en-US" altLang="zh-CN" sz="4000" b="1" dirty="0">
-                  <a:solidFill>
-                    <a:schemeClr val="bg1">
-                      <a:lumMod val="75000"/>
-                    </a:schemeClr>
-                  </a:solidFill>
-                  <a:latin typeface="Toppan Bunkyu Midashi Gothic Ex" panose="020B0900000000000000" pitchFamily="34" charset="-128"/>
-                  <a:ea typeface="Toppan Bunkyu Midashi Gothic Ex" panose="020B0900000000000000" pitchFamily="34" charset="-128"/>
-                </a:rPr>
-                <a:t>#</a:t>
-              </a:r>
-              <a:r>
-                <a:rPr kumimoji="1" lang="zh-CN" altLang="en-US" sz="4000" b="1" dirty="0">
-                  <a:solidFill>
-                    <a:schemeClr val="bg1">
-                      <a:lumMod val="75000"/>
-                    </a:schemeClr>
-                  </a:solidFill>
-                  <a:latin typeface="Toppan Bunkyu Midashi Gothic Ex" panose="020B0900000000000000" pitchFamily="34" charset="-128"/>
-                  <a:ea typeface="Toppan Bunkyu Midashi Gothic Ex" panose="020B0900000000000000" pitchFamily="34" charset="-128"/>
-                </a:rPr>
-                <a:t> </a:t>
-              </a:r>
-              <a:r>
-                <a:rPr kumimoji="1" lang="en-US" altLang="zh-CN" sz="8000" b="1" dirty="0">
-                  <a:ln w="9525">
-                    <a:solidFill>
-                      <a:schemeClr val="bg1"/>
-                    </a:solidFill>
-                    <a:prstDash val="solid"/>
-                  </a:ln>
-                  <a:solidFill>
-                    <a:schemeClr val="accent5"/>
-                  </a:solidFill>
-                  <a:effectLst>
-                    <a:outerShdw blurRad="12700" dist="38100" dir="2700000" algn="tl" rotWithShape="0">
-                      <a:schemeClr val="accent5">
-                        <a:lumMod val="60000"/>
-                        <a:lumOff val="40000"/>
-                      </a:schemeClr>
-                    </a:outerShdw>
-                  </a:effectLst>
-                  <a:latin typeface="Toppan Bunkyu Midashi Gothic Ex" panose="020B0900000000000000" pitchFamily="34" charset="-128"/>
-                  <a:ea typeface="Toppan Bunkyu Midashi Gothic Ex" panose="020B0900000000000000" pitchFamily="34" charset="-128"/>
-                </a:rPr>
-                <a:t>S</a:t>
-              </a:r>
-              <a:r>
-                <a:rPr kumimoji="1" lang="en-US" altLang="zh-CN" sz="6000" b="1" dirty="0">
-                  <a:ln w="9525">
-                    <a:solidFill>
-                      <a:schemeClr val="bg1"/>
-                    </a:solidFill>
-                    <a:prstDash val="solid"/>
-                  </a:ln>
-                  <a:solidFill>
-                    <a:schemeClr val="accent5"/>
-                  </a:solidFill>
-                  <a:effectLst>
-                    <a:outerShdw blurRad="12700" dist="38100" dir="2700000" algn="tl" rotWithShape="0">
-                      <a:schemeClr val="accent5">
-                        <a:lumMod val="60000"/>
-                        <a:lumOff val="40000"/>
-                      </a:schemeClr>
-                    </a:outerShdw>
-                  </a:effectLst>
-                  <a:latin typeface="Toppan Bunkyu Midashi Gothic Ex" panose="020B0900000000000000" pitchFamily="34" charset="-128"/>
-                  <a:ea typeface="Toppan Bunkyu Midashi Gothic Ex" panose="020B0900000000000000" pitchFamily="34" charset="-128"/>
-                </a:rPr>
-                <a:t>tata</a:t>
-              </a:r>
-              <a:endParaRPr kumimoji="1" lang="en-US" altLang="zh-CN" sz="7200" b="1" dirty="0">
-                <a:solidFill>
-                  <a:schemeClr val="bg1"/>
-                </a:solidFill>
-                <a:latin typeface="Toppan Bunkyu Midashi Gothic Ex" panose="020B0900000000000000" pitchFamily="34" charset="-128"/>
-                <a:ea typeface="Toppan Bunkyu Midashi Gothic Ex" panose="020B0900000000000000" pitchFamily="34" charset="-128"/>
-              </a:endParaRPr>
-            </a:p>
-          </p:txBody>
-        </p:sp>
-        <p:sp>
-          <p:nvSpPr>
-            <p:cNvPr id="7" name="文本框 6">
-              <a:extLst>
-                <a:ext uri="{FF2B5EF4-FFF2-40B4-BE49-F238E27FC236}">
-                  <a16:creationId xmlns:a16="http://schemas.microsoft.com/office/drawing/2014/main" id="{916B42EF-2803-D566-1593-21114CBCA44C}"/>
-                </a:ext>
-              </a:extLst>
-            </p:cNvPr>
-            <p:cNvSpPr txBox="1"/>
-            <p:nvPr/>
-          </p:nvSpPr>
-          <p:spPr>
-            <a:xfrm>
-              <a:off x="56763" y="1595483"/>
-              <a:ext cx="3557622" cy="1126912"/>
-            </a:xfrm>
-            <a:prstGeom prst="rect">
-              <a:avLst/>
-            </a:prstGeom>
-            <a:noFill/>
-          </p:spPr>
-          <p:txBody>
-            <a:bodyPr wrap="square">
-              <a:spAutoFit/>
-            </a:bodyPr>
-            <a:lstStyle/>
-            <a:p>
-              <a:pPr>
-                <a:lnSpc>
-                  <a:spcPct val="150000"/>
-                </a:lnSpc>
-              </a:pPr>
-              <a:r>
-                <a:rPr kumimoji="1" lang="zh-CN" altLang="en-US" sz="4000" b="1" dirty="0">
-                  <a:solidFill>
-                    <a:schemeClr val="bg1">
-                      <a:lumMod val="75000"/>
-                    </a:schemeClr>
-                  </a:solidFill>
-                  <a:latin typeface="Toppan Bunkyu Midashi Gothic Ex" panose="020B0900000000000000" pitchFamily="34" charset="-128"/>
-                  <a:ea typeface="Toppan Bunkyu Midashi Gothic Ex" panose="020B0900000000000000" pitchFamily="34" charset="-128"/>
-                </a:rPr>
-                <a:t>**</a:t>
-              </a:r>
-              <a:r>
-                <a:rPr kumimoji="1" lang="en-US" altLang="zh-CN" sz="4000" b="1" dirty="0">
-                  <a:solidFill>
-                    <a:schemeClr val="bg1">
-                      <a:lumMod val="75000"/>
-                    </a:schemeClr>
-                  </a:solidFill>
-                  <a:latin typeface="Toppan Bunkyu Midashi Gothic Ex" panose="020B0900000000000000" pitchFamily="34" charset="-128"/>
-                  <a:ea typeface="Toppan Bunkyu Midashi Gothic Ex" panose="020B0900000000000000" pitchFamily="34" charset="-128"/>
-                </a:rPr>
-                <a:t>##</a:t>
-              </a:r>
-              <a:r>
-                <a:rPr kumimoji="1" lang="zh-CN" altLang="en-US" sz="4000" b="1" dirty="0">
-                  <a:solidFill>
-                    <a:schemeClr val="bg1">
-                      <a:lumMod val="75000"/>
-                    </a:schemeClr>
-                  </a:solidFill>
-                  <a:latin typeface="Toppan Bunkyu Midashi Gothic Ex" panose="020B0900000000000000" pitchFamily="34" charset="-128"/>
-                  <a:ea typeface="Toppan Bunkyu Midashi Gothic Ex" panose="020B0900000000000000" pitchFamily="34" charset="-128"/>
-                </a:rPr>
-                <a:t> </a:t>
-              </a:r>
-              <a:r>
-                <a:rPr kumimoji="1" lang="en-US" altLang="zh-CN" sz="5400" b="1" dirty="0">
-                  <a:ln w="10160">
-                    <a:solidFill>
-                      <a:srgbClr val="00B0F0"/>
-                    </a:solidFill>
-                    <a:prstDash val="solid"/>
-                  </a:ln>
-                  <a:solidFill>
-                    <a:srgbClr val="FFFFFF"/>
-                  </a:solidFill>
-                  <a:effectLst>
-                    <a:outerShdw blurRad="38100" dist="22860" dir="5400000" algn="tl" rotWithShape="0">
-                      <a:srgbClr val="000000">
-                        <a:alpha val="30000"/>
-                      </a:srgbClr>
-                    </a:outerShdw>
-                  </a:effectLst>
-                  <a:latin typeface="Toppan Bunkyu Midashi Gothic Ex" panose="020B0900000000000000" pitchFamily="34" charset="-128"/>
-                  <a:ea typeface="Toppan Bunkyu Midashi Gothic Ex" panose="020B0900000000000000" pitchFamily="34" charset="-128"/>
-                </a:rPr>
-                <a:t>O</a:t>
-              </a:r>
-              <a:r>
-                <a:rPr kumimoji="1" lang="en-US" altLang="zh-CN" sz="4000" b="1" dirty="0">
-                  <a:ln w="10160">
-                    <a:solidFill>
-                      <a:srgbClr val="00B0F0"/>
-                    </a:solidFill>
-                    <a:prstDash val="solid"/>
-                  </a:ln>
-                  <a:solidFill>
-                    <a:srgbClr val="FFFFFF"/>
-                  </a:solidFill>
-                  <a:effectLst>
-                    <a:outerShdw blurRad="38100" dist="22860" dir="5400000" algn="tl" rotWithShape="0">
-                      <a:srgbClr val="000000">
-                        <a:alpha val="30000"/>
-                      </a:srgbClr>
-                    </a:outerShdw>
-                  </a:effectLst>
-                  <a:latin typeface="Toppan Bunkyu Midashi Gothic Ex" panose="020B0900000000000000" pitchFamily="34" charset="-128"/>
-                  <a:ea typeface="Toppan Bunkyu Midashi Gothic Ex" panose="020B0900000000000000" pitchFamily="34" charset="-128"/>
-                </a:rPr>
-                <a:t>utline</a:t>
-              </a:r>
-              <a:endParaRPr kumimoji="1" lang="zh-CN" altLang="en-US" sz="4800" b="1" dirty="0">
-                <a:ln w="10160">
-                  <a:solidFill>
-                    <a:srgbClr val="00B0F0"/>
-                  </a:solidFill>
-                  <a:prstDash val="solid"/>
-                </a:ln>
-                <a:solidFill>
-                  <a:schemeClr val="bg1"/>
-                </a:solidFill>
-                <a:latin typeface="Toppan Bunkyu Midashi Gothic Ex" panose="020B0900000000000000" pitchFamily="34" charset="-128"/>
-                <a:ea typeface="Toppan Bunkyu Midashi Gothic Ex" panose="020B0900000000000000" pitchFamily="34" charset="-128"/>
-              </a:endParaRPr>
-            </a:p>
-          </p:txBody>
-        </p:sp>
-        <p:pic>
-          <p:nvPicPr>
-            <p:cNvPr id="10" name="图片 9">
-              <a:extLst>
-                <a:ext uri="{FF2B5EF4-FFF2-40B4-BE49-F238E27FC236}">
-                  <a16:creationId xmlns:a16="http://schemas.microsoft.com/office/drawing/2014/main" id="{BD54AE8D-291C-C2E6-B029-11528136178F}"/>
-                </a:ext>
-              </a:extLst>
-            </p:cNvPr>
-            <p:cNvPicPr>
-              <a:picLocks noChangeAspect="1"/>
-            </p:cNvPicPr>
-            <p:nvPr/>
-          </p:nvPicPr>
-          <p:blipFill>
-            <a:blip r:embed="rId2">
-              <a:extLst>
-                <a:ext uri="{BEBA8EAE-BF5A-486C-A8C5-ECC9F3942E4B}">
-                  <a14:imgProps xmlns:a14="http://schemas.microsoft.com/office/drawing/2010/main">
-                    <a14:imgLayer r:embed="rId3">
-                      <a14:imgEffect>
-                        <a14:backgroundRemoval t="10000" b="90000" l="10000" r="90000">
-                          <a14:foregroundMark x1="42000" y1="53425" x2="42000" y2="53425"/>
-                          <a14:foregroundMark x1="62000" y1="69863" x2="62000" y2="69863"/>
-                        </a14:backgroundRemoval>
-                      </a14:imgEffect>
-                    </a14:imgLayer>
-                  </a14:imgProps>
-                </a:ext>
-              </a:extLst>
-            </a:blip>
-            <a:stretch>
-              <a:fillRect/>
-            </a:stretch>
-          </p:blipFill>
-          <p:spPr>
-            <a:xfrm>
-              <a:off x="2850471" y="569142"/>
-              <a:ext cx="635000" cy="457200"/>
-            </a:xfrm>
-            <a:prstGeom prst="rect">
-              <a:avLst/>
-            </a:prstGeom>
-          </p:spPr>
-        </p:pic>
-      </p:grpSp>
-    </p:spTree>
-    <p:extLst>
-      <p:ext uri="{BB962C8B-B14F-4D97-AF65-F5344CB8AC3E}">
-        <p14:creationId xmlns:p14="http://schemas.microsoft.com/office/powerpoint/2010/main" val="3746901599"/>
-      </p:ext>
-    </p:extLst>
-  </p:cSld>
-  <p:clrMapOvr>
-    <a:masterClrMapping/>
-  </p:clrMapOvr>
-</p:sld>
-</file>
-
 <file path=ppt/theme/theme1.xml><?xml version="1.0" encoding="utf-8"?>
 <a:theme xmlns:a="http://schemas.openxmlformats.org/drawingml/2006/main" name="Office 主题​​">
   <a:themeElements>

</xml_diff>

<commit_message>
feat: update README and README_CN for rebranding; enhance platform support details
</commit_message>
<xml_diff>
--- a/icon.pptx
+++ b/icon.pptx
@@ -112,23 +112,31 @@
 </p:presentation>
 </file>
 
+<file path=ppt/revisionInfo.xml><?xml version="1.0" encoding="utf-8"?>
+<p1510:revInfo xmlns:a="http://schemas.openxmlformats.org/drawingml/2006/main" xmlns:r="http://schemas.openxmlformats.org/officeDocument/2006/relationships" xmlns:p1510="http://schemas.microsoft.com/office/powerpoint/2015/10/main">
+  <p1510:revLst>
+    <p1510:client id="{7B01A33C-9F31-FF40-B88D-D504EF10CD5B}" v="4" dt="2026-01-26T16:34:07.765"/>
+  </p1510:revLst>
+</p1510:revInfo>
+</file>
+
 <file path=ppt/changesInfos/changesInfo1.xml><?xml version="1.0" encoding="utf-8"?>
 <pc:chgInfo xmlns:a="http://schemas.openxmlformats.org/drawingml/2006/main" xmlns:r="http://schemas.openxmlformats.org/officeDocument/2006/relationships" xmlns:ac="http://schemas.microsoft.com/office/drawing/2013/main/command" xmlns:pc="http://schemas.microsoft.com/office/powerpoint/2013/main/command">
   <pc:docChgLst>
     <pc:chgData name="Zihao Viston Wang" userId="bb38f0bb24686ff5" providerId="LiveId" clId="{6B238CD4-3FE9-582E-A7AB-2A0F90EE9F12}"/>
     <pc:docChg chg="undo custSel addSld delSld modSld">
-      <pc:chgData name="Zihao Viston Wang" userId="bb38f0bb24686ff5" providerId="LiveId" clId="{6B238CD4-3FE9-582E-A7AB-2A0F90EE9F12}" dt="2026-01-26T15:48:26.139" v="324" actId="2696"/>
+      <pc:chgData name="Zihao Viston Wang" userId="bb38f0bb24686ff5" providerId="LiveId" clId="{6B238CD4-3FE9-582E-A7AB-2A0F90EE9F12}" dt="2026-01-26T16:34:59.886" v="495" actId="164"/>
       <pc:docMkLst>
         <pc:docMk/>
       </pc:docMkLst>
       <pc:sldChg chg="addSp delSp modSp mod">
-        <pc:chgData name="Zihao Viston Wang" userId="bb38f0bb24686ff5" providerId="LiveId" clId="{6B238CD4-3FE9-582E-A7AB-2A0F90EE9F12}" dt="2026-01-26T14:43:33.930" v="323" actId="1035"/>
+        <pc:chgData name="Zihao Viston Wang" userId="bb38f0bb24686ff5" providerId="LiveId" clId="{6B238CD4-3FE9-582E-A7AB-2A0F90EE9F12}" dt="2026-01-26T16:34:59.886" v="495" actId="164"/>
         <pc:sldMkLst>
           <pc:docMk/>
           <pc:sldMk cId="3110185412" sldId="256"/>
         </pc:sldMkLst>
         <pc:spChg chg="mod topLvl">
-          <ac:chgData name="Zihao Viston Wang" userId="bb38f0bb24686ff5" providerId="LiveId" clId="{6B238CD4-3FE9-582E-A7AB-2A0F90EE9F12}" dt="2026-01-26T14:43:33.930" v="323" actId="1035"/>
+          <ac:chgData name="Zihao Viston Wang" userId="bb38f0bb24686ff5" providerId="LiveId" clId="{6B238CD4-3FE9-582E-A7AB-2A0F90EE9F12}" dt="2026-01-26T16:34:53.136" v="494" actId="12788"/>
           <ac:spMkLst>
             <pc:docMk/>
             <pc:sldMk cId="3110185412" sldId="256"/>
@@ -136,23 +144,39 @@
           </ac:spMkLst>
         </pc:spChg>
         <pc:spChg chg="mod topLvl">
-          <ac:chgData name="Zihao Viston Wang" userId="bb38f0bb24686ff5" providerId="LiveId" clId="{6B238CD4-3FE9-582E-A7AB-2A0F90EE9F12}" dt="2026-01-26T14:42:45.739" v="292" actId="207"/>
+          <ac:chgData name="Zihao Viston Wang" userId="bb38f0bb24686ff5" providerId="LiveId" clId="{6B238CD4-3FE9-582E-A7AB-2A0F90EE9F12}" dt="2026-01-26T16:28:56.648" v="326" actId="165"/>
           <ac:spMkLst>
             <pc:docMk/>
             <pc:sldMk cId="3110185412" sldId="256"/>
             <ac:spMk id="5" creationId="{07EFA768-474C-1D69-ABBB-1A18066AFD37}"/>
           </ac:spMkLst>
         </pc:spChg>
+        <pc:spChg chg="add del mod topLvl">
+          <ac:chgData name="Zihao Viston Wang" userId="bb38f0bb24686ff5" providerId="LiveId" clId="{6B238CD4-3FE9-582E-A7AB-2A0F90EE9F12}" dt="2026-01-26T16:34:33.586" v="492" actId="478"/>
+          <ac:spMkLst>
+            <pc:docMk/>
+            <pc:sldMk cId="3110185412" sldId="256"/>
+            <ac:spMk id="6" creationId="{A051D0A1-6F3B-2694-3FFB-A0FF5D837641}"/>
+          </ac:spMkLst>
+        </pc:spChg>
         <pc:spChg chg="mod topLvl">
-          <ac:chgData name="Zihao Viston Wang" userId="bb38f0bb24686ff5" providerId="LiveId" clId="{6B238CD4-3FE9-582E-A7AB-2A0F90EE9F12}" dt="2026-01-26T14:43:33.930" v="323" actId="1035"/>
+          <ac:chgData name="Zihao Viston Wang" userId="bb38f0bb24686ff5" providerId="LiveId" clId="{6B238CD4-3FE9-582E-A7AB-2A0F90EE9F12}" dt="2026-01-26T16:34:53.136" v="494" actId="12788"/>
           <ac:spMkLst>
             <pc:docMk/>
             <pc:sldMk cId="3110185412" sldId="256"/>
             <ac:spMk id="7" creationId="{806BE3ED-8C62-A8F7-4ABD-4B54C1FED89D}"/>
           </ac:spMkLst>
         </pc:spChg>
-        <pc:grpChg chg="add">
-          <ac:chgData name="Zihao Viston Wang" userId="bb38f0bb24686ff5" providerId="LiveId" clId="{6B238CD4-3FE9-582E-A7AB-2A0F90EE9F12}" dt="2026-01-26T14:41:03.924" v="277" actId="164"/>
+        <pc:spChg chg="add del mod">
+          <ac:chgData name="Zihao Viston Wang" userId="bb38f0bb24686ff5" providerId="LiveId" clId="{6B238CD4-3FE9-582E-A7AB-2A0F90EE9F12}" dt="2026-01-26T16:34:32.026" v="491" actId="478"/>
+          <ac:spMkLst>
+            <pc:docMk/>
+            <pc:sldMk cId="3110185412" sldId="256"/>
+            <ac:spMk id="9" creationId="{CDDAC72A-02F5-0503-B680-A367037B7503}"/>
+          </ac:spMkLst>
+        </pc:spChg>
+        <pc:grpChg chg="add del mod">
+          <ac:chgData name="Zihao Viston Wang" userId="bb38f0bb24686ff5" providerId="LiveId" clId="{6B238CD4-3FE9-582E-A7AB-2A0F90EE9F12}" dt="2026-01-26T16:28:56.648" v="326" actId="165"/>
           <ac:grpSpMkLst>
             <pc:docMk/>
             <pc:sldMk cId="3110185412" sldId="256"/>
@@ -165,6 +189,30 @@
             <pc:docMk/>
             <pc:sldMk cId="3110185412" sldId="256"/>
             <ac:grpSpMk id="3" creationId="{1A47D585-7C40-2604-E895-7AD0A1120EEC}"/>
+          </ac:grpSpMkLst>
+        </pc:grpChg>
+        <pc:grpChg chg="add del mod">
+          <ac:chgData name="Zihao Viston Wang" userId="bb38f0bb24686ff5" providerId="LiveId" clId="{6B238CD4-3FE9-582E-A7AB-2A0F90EE9F12}" dt="2026-01-26T16:29:23.312" v="351" actId="165"/>
+          <ac:grpSpMkLst>
+            <pc:docMk/>
+            <pc:sldMk cId="3110185412" sldId="256"/>
+            <ac:grpSpMk id="3" creationId="{8F6F027F-48A9-7191-2AB7-70BACF94505B}"/>
+          </ac:grpSpMkLst>
+        </pc:grpChg>
+        <pc:grpChg chg="add del mod">
+          <ac:chgData name="Zihao Viston Wang" userId="bb38f0bb24686ff5" providerId="LiveId" clId="{6B238CD4-3FE9-582E-A7AB-2A0F90EE9F12}" dt="2026-01-26T16:32:11.568" v="429" actId="165"/>
+          <ac:grpSpMkLst>
+            <pc:docMk/>
+            <pc:sldMk cId="3110185412" sldId="256"/>
+            <ac:grpSpMk id="8" creationId="{A3D9AC22-ED2F-20A9-3B99-5F40315732DC}"/>
+          </ac:grpSpMkLst>
+        </pc:grpChg>
+        <pc:grpChg chg="add">
+          <ac:chgData name="Zihao Viston Wang" userId="bb38f0bb24686ff5" providerId="LiveId" clId="{6B238CD4-3FE9-582E-A7AB-2A0F90EE9F12}" dt="2026-01-26T16:34:59.886" v="495" actId="164"/>
+          <ac:grpSpMkLst>
+            <pc:docMk/>
+            <pc:sldMk cId="3110185412" sldId="256"/>
+            <ac:grpSpMk id="10" creationId="{8BDC5445-F11B-251B-8166-CC6CCA352F08}"/>
           </ac:grpSpMkLst>
         </pc:grpChg>
       </pc:sldChg>
@@ -318,7 +366,7 @@
           <a:p>
             <a:fld id="{1D56FAFE-020E-6E49-8BB3-7A3C3A7092FE}" type="datetimeFigureOut">
               <a:rPr kumimoji="1" lang="zh-CN" altLang="en-US" smtClean="0"/>
-              <a:t>2026/1/26</a:t>
+              <a:t>2026/1/27</a:t>
             </a:fld>
             <a:endParaRPr kumimoji="1" lang="zh-CN" altLang="en-US"/>
           </a:p>
@@ -488,7 +536,7 @@
           <a:p>
             <a:fld id="{1D56FAFE-020E-6E49-8BB3-7A3C3A7092FE}" type="datetimeFigureOut">
               <a:rPr kumimoji="1" lang="zh-CN" altLang="en-US" smtClean="0"/>
-              <a:t>2026/1/26</a:t>
+              <a:t>2026/1/27</a:t>
             </a:fld>
             <a:endParaRPr kumimoji="1" lang="zh-CN" altLang="en-US"/>
           </a:p>
@@ -668,7 +716,7 @@
           <a:p>
             <a:fld id="{1D56FAFE-020E-6E49-8BB3-7A3C3A7092FE}" type="datetimeFigureOut">
               <a:rPr kumimoji="1" lang="zh-CN" altLang="en-US" smtClean="0"/>
-              <a:t>2026/1/26</a:t>
+              <a:t>2026/1/27</a:t>
             </a:fld>
             <a:endParaRPr kumimoji="1" lang="zh-CN" altLang="en-US"/>
           </a:p>
@@ -838,7 +886,7 @@
           <a:p>
             <a:fld id="{1D56FAFE-020E-6E49-8BB3-7A3C3A7092FE}" type="datetimeFigureOut">
               <a:rPr kumimoji="1" lang="zh-CN" altLang="en-US" smtClean="0"/>
-              <a:t>2026/1/26</a:t>
+              <a:t>2026/1/27</a:t>
             </a:fld>
             <a:endParaRPr kumimoji="1" lang="zh-CN" altLang="en-US"/>
           </a:p>
@@ -1084,7 +1132,7 @@
           <a:p>
             <a:fld id="{1D56FAFE-020E-6E49-8BB3-7A3C3A7092FE}" type="datetimeFigureOut">
               <a:rPr kumimoji="1" lang="zh-CN" altLang="en-US" smtClean="0"/>
-              <a:t>2026/1/26</a:t>
+              <a:t>2026/1/27</a:t>
             </a:fld>
             <a:endParaRPr kumimoji="1" lang="zh-CN" altLang="en-US"/>
           </a:p>
@@ -1316,7 +1364,7 @@
           <a:p>
             <a:fld id="{1D56FAFE-020E-6E49-8BB3-7A3C3A7092FE}" type="datetimeFigureOut">
               <a:rPr kumimoji="1" lang="zh-CN" altLang="en-US" smtClean="0"/>
-              <a:t>2026/1/26</a:t>
+              <a:t>2026/1/27</a:t>
             </a:fld>
             <a:endParaRPr kumimoji="1" lang="zh-CN" altLang="en-US"/>
           </a:p>
@@ -1683,7 +1731,7 @@
           <a:p>
             <a:fld id="{1D56FAFE-020E-6E49-8BB3-7A3C3A7092FE}" type="datetimeFigureOut">
               <a:rPr kumimoji="1" lang="zh-CN" altLang="en-US" smtClean="0"/>
-              <a:t>2026/1/26</a:t>
+              <a:t>2026/1/27</a:t>
             </a:fld>
             <a:endParaRPr kumimoji="1" lang="zh-CN" altLang="en-US"/>
           </a:p>
@@ -1801,7 +1849,7 @@
           <a:p>
             <a:fld id="{1D56FAFE-020E-6E49-8BB3-7A3C3A7092FE}" type="datetimeFigureOut">
               <a:rPr kumimoji="1" lang="zh-CN" altLang="en-US" smtClean="0"/>
-              <a:t>2026/1/26</a:t>
+              <a:t>2026/1/27</a:t>
             </a:fld>
             <a:endParaRPr kumimoji="1" lang="zh-CN" altLang="en-US"/>
           </a:p>
@@ -1896,7 +1944,7 @@
           <a:p>
             <a:fld id="{1D56FAFE-020E-6E49-8BB3-7A3C3A7092FE}" type="datetimeFigureOut">
               <a:rPr kumimoji="1" lang="zh-CN" altLang="en-US" smtClean="0"/>
-              <a:t>2026/1/26</a:t>
+              <a:t>2026/1/27</a:t>
             </a:fld>
             <a:endParaRPr kumimoji="1" lang="zh-CN" altLang="en-US"/>
           </a:p>
@@ -2173,7 +2221,7 @@
           <a:p>
             <a:fld id="{1D56FAFE-020E-6E49-8BB3-7A3C3A7092FE}" type="datetimeFigureOut">
               <a:rPr kumimoji="1" lang="zh-CN" altLang="en-US" smtClean="0"/>
-              <a:t>2026/1/26</a:t>
+              <a:t>2026/1/27</a:t>
             </a:fld>
             <a:endParaRPr kumimoji="1" lang="zh-CN" altLang="en-US"/>
           </a:p>
@@ -2430,7 +2478,7 @@
           <a:p>
             <a:fld id="{1D56FAFE-020E-6E49-8BB3-7A3C3A7092FE}" type="datetimeFigureOut">
               <a:rPr kumimoji="1" lang="zh-CN" altLang="en-US" smtClean="0"/>
-              <a:t>2026/1/26</a:t>
+              <a:t>2026/1/27</a:t>
             </a:fld>
             <a:endParaRPr kumimoji="1" lang="zh-CN" altLang="en-US"/>
           </a:p>
@@ -2643,7 +2691,7 @@
           <a:p>
             <a:fld id="{1D56FAFE-020E-6E49-8BB3-7A3C3A7092FE}" type="datetimeFigureOut">
               <a:rPr kumimoji="1" lang="zh-CN" altLang="en-US" smtClean="0"/>
-              <a:t>2026/1/26</a:t>
+              <a:t>2026/1/27</a:t>
             </a:fld>
             <a:endParaRPr kumimoji="1" lang="zh-CN" altLang="en-US"/>
           </a:p>
@@ -3050,10 +3098,10 @@
       </p:grpSpPr>
       <p:grpSp>
         <p:nvGrpSpPr>
-          <p:cNvPr id="2" name="组合 1">
+          <p:cNvPr id="10" name="组合 9">
             <a:extLst>
               <a:ext uri="{FF2B5EF4-FFF2-40B4-BE49-F238E27FC236}">
-                <a16:creationId xmlns:a16="http://schemas.microsoft.com/office/drawing/2014/main" id="{BE089064-5905-65C4-10C0-3B5DA1E5436B}"/>
+                <a16:creationId xmlns:a16="http://schemas.microsoft.com/office/drawing/2014/main" id="{8BDC5445-F11B-251B-8166-CC6CCA352F08}"/>
               </a:ext>
             </a:extLst>
           </p:cNvPr>
@@ -3062,9 +3110,9 @@
         </p:nvGrpSpPr>
         <p:grpSpPr>
           <a:xfrm>
-            <a:off x="0" y="2433"/>
+            <a:off x="0" y="0"/>
             <a:ext cx="3600450" cy="3600450"/>
-            <a:chOff x="0" y="2433"/>
+            <a:chOff x="0" y="0"/>
             <a:chExt cx="3600450" cy="3600450"/>
           </a:xfrm>
         </p:grpSpPr>
@@ -3082,7 +3130,7 @@
           </p:nvSpPr>
           <p:spPr>
             <a:xfrm>
-              <a:off x="0" y="2433"/>
+              <a:off x="0" y="0"/>
               <a:ext cx="3600450" cy="3600450"/>
             </a:xfrm>
             <a:prstGeom prst="rect">
@@ -3144,7 +3192,7 @@
           </p:nvSpPr>
           <p:spPr>
             <a:xfrm>
-              <a:off x="221107" y="604138"/>
+              <a:off x="221106" y="579407"/>
               <a:ext cx="3158237" cy="1446550"/>
             </a:xfrm>
             <a:prstGeom prst="rect">
@@ -3197,8 +3245,8 @@
           </p:nvSpPr>
           <p:spPr>
             <a:xfrm>
-              <a:off x="79705" y="1730170"/>
-              <a:ext cx="3441039" cy="923330"/>
+              <a:off x="79705" y="1655255"/>
+              <a:ext cx="3441039" cy="1015663"/>
             </a:xfrm>
             <a:prstGeom prst="rect">
               <a:avLst/>
@@ -3213,7 +3261,7 @@
             <a:p>
               <a:pPr algn="ctr"/>
               <a:r>
-                <a:rPr lang="en-US" altLang="zh-CN" sz="5400" dirty="0">
+                <a:rPr lang="en-US" altLang="zh-CN" sz="6000" dirty="0">
                   <a:ln>
                     <a:solidFill>
                       <a:schemeClr val="tx1">
@@ -3234,7 +3282,7 @@
                 <a:t>A</a:t>
               </a:r>
               <a:r>
-                <a:rPr lang="en-US" altLang="zh-CN" sz="4400" dirty="0">
+                <a:rPr lang="en-US" altLang="zh-CN" sz="4800" dirty="0">
                   <a:ln>
                     <a:solidFill>
                       <a:schemeClr val="tx1">
@@ -3255,7 +3303,7 @@
                 <a:t>ll</a:t>
               </a:r>
               <a:r>
-                <a:rPr lang="zh-CN" altLang="en-US" sz="5400" dirty="0">
+                <a:rPr lang="zh-CN" altLang="en-US" sz="6000" dirty="0">
                   <a:ln>
                     <a:solidFill>
                       <a:schemeClr val="tx1">
@@ -3276,7 +3324,7 @@
                 <a:t> </a:t>
               </a:r>
               <a:r>
-                <a:rPr lang="en-US" altLang="zh-CN" sz="4400" dirty="0">
+                <a:rPr lang="en-US" altLang="zh-CN" sz="4800" dirty="0">
                   <a:ln>
                     <a:solidFill>
                       <a:schemeClr val="tx1">
@@ -3297,7 +3345,7 @@
                 <a:t>in</a:t>
               </a:r>
               <a:r>
-                <a:rPr lang="zh-CN" altLang="en-US" sz="5400" dirty="0">
+                <a:rPr lang="zh-CN" altLang="en-US" sz="6000" dirty="0">
                   <a:ln>
                     <a:solidFill>
                       <a:schemeClr val="tx1">
@@ -3318,7 +3366,7 @@
                 <a:t> </a:t>
               </a:r>
               <a:r>
-                <a:rPr lang="en-US" altLang="zh-CN" sz="5400" dirty="0">
+                <a:rPr lang="en-US" altLang="zh-CN" sz="6000" dirty="0">
                   <a:ln>
                     <a:solidFill>
                       <a:schemeClr val="tx1">
@@ -3339,7 +3387,7 @@
                 <a:t>O</a:t>
               </a:r>
               <a:r>
-                <a:rPr lang="en-US" altLang="zh-CN" sz="4400" dirty="0">
+                <a:rPr lang="en-US" altLang="zh-CN" sz="4800" dirty="0">
                   <a:ln>
                     <a:solidFill>
                       <a:schemeClr val="tx1">
@@ -3359,7 +3407,7 @@
                 </a:rPr>
                 <a:t>ne</a:t>
               </a:r>
-              <a:endParaRPr lang="zh-CN" altLang="en-US" sz="5400" dirty="0">
+              <a:endParaRPr lang="zh-CN" altLang="en-US" sz="6000" dirty="0">
                 <a:ln>
                   <a:solidFill>
                     <a:schemeClr val="tx1">

</xml_diff>